<commit_message>
Correção da 4ª questão
</commit_message>
<xml_diff>
--- a/Exercicio - Resolução.pptx
+++ b/Exercicio - Resolução.pptx
@@ -8690,7 +8690,7 @@
             </a:r>
             <a:r>
               <a:rPr lang="en-US" dirty="0"/>
-              <a:t> (2, ‘B’, ‘C’, ‘A’)</a:t>
+              <a:t> (1, ‘C’, ‘B’, ‘A’)</a:t>
             </a:r>
           </a:p>
           <a:p>
@@ -8704,7 +8704,7 @@
             </a:r>
             <a:r>
               <a:rPr lang="en-US" dirty="0"/>
-              <a:t> (1, ‘B’, ‘A’, ‘C’)</a:t>
+              <a:t> (2, ‘B’, ‘C’, ‘A’)</a:t>
             </a:r>
           </a:p>
           <a:p>
@@ -8718,7 +8718,7 @@
             </a:r>
             <a:r>
               <a:rPr lang="en-US" dirty="0"/>
-              <a:t> (3, ‘C’, ‘B’, ‘A’)</a:t>
+              <a:t> (1, ‘B’, ‘A’, ‘C’)</a:t>
             </a:r>
           </a:p>
           <a:p>
@@ -8732,7 +8732,7 @@
             </a:r>
             <a:r>
               <a:rPr lang="en-US" dirty="0"/>
-              <a:t> (2, ‘C’, ‘A’, ‘B’)</a:t>
+              <a:t> (1, ‘A’, ‘C’, ‘B’)</a:t>
             </a:r>
           </a:p>
           <a:p>
@@ -8746,7 +8746,7 @@
             </a:r>
             <a:r>
               <a:rPr lang="en-US" dirty="0"/>
-              <a:t> (1, ‘C’, ‘B’, ‘A’)</a:t>
+              <a:t> (3, ‘C’, ‘B’, ‘A’)</a:t>
             </a:r>
           </a:p>
         </p:txBody>
@@ -11631,7 +11631,6 @@
               <a:rPr lang="en-US" sz="2000" dirty="0"/>
               <a:t>}</a:t>
             </a:r>
-            <a:endParaRPr lang="en-US" sz="2000" dirty="0"/>
           </a:p>
         </p:txBody>
       </p:sp>
@@ -14437,6 +14436,142 @@
 </file>
 
 <file path=customXml/item2.xml><?xml version="1.0" encoding="utf-8"?>
+<p:properties xmlns:p="http://schemas.microsoft.com/office/2006/metadata/properties" xmlns:xsi="http://www.w3.org/2001/XMLSchema-instance" xmlns:pc="http://schemas.microsoft.com/office/infopath/2007/PartnerControls">
+  <documentManagement>
+    <LocPublishedLinkedAssetsLookup xmlns="4873beb7-5857-4685-be1f-d57550cc96cc" xsi:nil="true"/>
+    <ApprovalStatus xmlns="4873beb7-5857-4685-be1f-d57550cc96cc">InProgress</ApprovalStatus>
+    <MarketSpecific xmlns="4873beb7-5857-4685-be1f-d57550cc96cc">false</MarketSpecific>
+    <LocComments xmlns="4873beb7-5857-4685-be1f-d57550cc96cc" xsi:nil="true"/>
+    <LocLastLocAttemptVersionTypeLookup xmlns="4873beb7-5857-4685-be1f-d57550cc96cc" xsi:nil="true"/>
+    <DirectSourceMarket xmlns="4873beb7-5857-4685-be1f-d57550cc96cc" xsi:nil="true"/>
+    <ThumbnailAssetId xmlns="4873beb7-5857-4685-be1f-d57550cc96cc" xsi:nil="true"/>
+    <PrimaryImageGen xmlns="4873beb7-5857-4685-be1f-d57550cc96cc">false</PrimaryImageGen>
+    <LocNewPublishedVersionLookup xmlns="4873beb7-5857-4685-be1f-d57550cc96cc" xsi:nil="true"/>
+    <LegacyData xmlns="4873beb7-5857-4685-be1f-d57550cc96cc" xsi:nil="true"/>
+    <LocRecommendedHandoff xmlns="4873beb7-5857-4685-be1f-d57550cc96cc" xsi:nil="true"/>
+    <BusinessGroup xmlns="4873beb7-5857-4685-be1f-d57550cc96cc" xsi:nil="true"/>
+    <BlockPublish xmlns="4873beb7-5857-4685-be1f-d57550cc96cc">false</BlockPublish>
+    <TPFriendlyName xmlns="4873beb7-5857-4685-be1f-d57550cc96cc" xsi:nil="true"/>
+    <LocOverallPublishStatusLookup xmlns="4873beb7-5857-4685-be1f-d57550cc96cc" xsi:nil="true"/>
+    <NumericId xmlns="4873beb7-5857-4685-be1f-d57550cc96cc" xsi:nil="true"/>
+    <APEditor xmlns="4873beb7-5857-4685-be1f-d57550cc96cc">
+      <UserInfo>
+        <DisplayName/>
+        <AccountId xsi:nil="true"/>
+        <AccountType/>
+      </UserInfo>
+    </APEditor>
+    <SourceTitle xmlns="4873beb7-5857-4685-be1f-d57550cc96cc" xsi:nil="true"/>
+    <OpenTemplate xmlns="4873beb7-5857-4685-be1f-d57550cc96cc">true</OpenTemplate>
+    <LocOverallLocStatusLookup xmlns="4873beb7-5857-4685-be1f-d57550cc96cc" xsi:nil="true"/>
+    <UALocComments xmlns="4873beb7-5857-4685-be1f-d57550cc96cc" xsi:nil="true"/>
+    <ParentAssetId xmlns="4873beb7-5857-4685-be1f-d57550cc96cc" xsi:nil="true"/>
+    <IntlLangReviewDate xmlns="4873beb7-5857-4685-be1f-d57550cc96cc" xsi:nil="true"/>
+    <FeatureTagsTaxHTField0 xmlns="4873beb7-5857-4685-be1f-d57550cc96cc">
+      <Terms xmlns="http://schemas.microsoft.com/office/infopath/2007/PartnerControls"/>
+    </FeatureTagsTaxHTField0>
+    <PublishStatusLookup xmlns="4873beb7-5857-4685-be1f-d57550cc96cc">
+      <Value>1345093</Value>
+    </PublishStatusLookup>
+    <Providers xmlns="4873beb7-5857-4685-be1f-d57550cc96cc" xsi:nil="true"/>
+    <MachineTranslated xmlns="4873beb7-5857-4685-be1f-d57550cc96cc">false</MachineTranslated>
+    <OriginalSourceMarket xmlns="4873beb7-5857-4685-be1f-d57550cc96cc" xsi:nil="true"/>
+    <APDescription xmlns="4873beb7-5857-4685-be1f-d57550cc96cc">This simple template design works for technology and  businesses, but it's versatile enough to use in other contexts.  It features multiple slide layouts designed for widescreen (16x9 resolution) and includes a sample SmartArt list and chart that are easily editable.</APDescription>
+    <ClipArtFilename xmlns="4873beb7-5857-4685-be1f-d57550cc96cc" xsi:nil="true"/>
+    <ContentItem xmlns="4873beb7-5857-4685-be1f-d57550cc96cc" xsi:nil="true"/>
+    <TPInstallLocation xmlns="4873beb7-5857-4685-be1f-d57550cc96cc" xsi:nil="true"/>
+    <PublishTargets xmlns="4873beb7-5857-4685-be1f-d57550cc96cc">OfficeOnlineVNext</PublishTargets>
+    <TimesCloned xmlns="4873beb7-5857-4685-be1f-d57550cc96cc" xsi:nil="true"/>
+    <AssetStart xmlns="4873beb7-5857-4685-be1f-d57550cc96cc">2011-11-26T00:30:00+00:00</AssetStart>
+    <Provider xmlns="4873beb7-5857-4685-be1f-d57550cc96cc" xsi:nil="true"/>
+    <AcquiredFrom xmlns="4873beb7-5857-4685-be1f-d57550cc96cc">Internal MS</AcquiredFrom>
+    <FriendlyTitle xmlns="4873beb7-5857-4685-be1f-d57550cc96cc" xsi:nil="true"/>
+    <LastHandOff xmlns="4873beb7-5857-4685-be1f-d57550cc96cc" xsi:nil="true"/>
+    <TPClientViewer xmlns="4873beb7-5857-4685-be1f-d57550cc96cc" xsi:nil="true"/>
+    <TemplateStatus xmlns="4873beb7-5857-4685-be1f-d57550cc96cc">Complete</TemplateStatus>
+    <Downloads xmlns="4873beb7-5857-4685-be1f-d57550cc96cc">0</Downloads>
+    <OOCacheId xmlns="4873beb7-5857-4685-be1f-d57550cc96cc" xsi:nil="true"/>
+    <IsDeleted xmlns="4873beb7-5857-4685-be1f-d57550cc96cc">false</IsDeleted>
+    <LocPublishedDependentAssetsLookup xmlns="4873beb7-5857-4685-be1f-d57550cc96cc" xsi:nil="true"/>
+    <TPExecutable xmlns="4873beb7-5857-4685-be1f-d57550cc96cc" xsi:nil="true"/>
+    <EditorialTags xmlns="4873beb7-5857-4685-be1f-d57550cc96cc" xsi:nil="true"/>
+    <SubmitterId xmlns="4873beb7-5857-4685-be1f-d57550cc96cc" xsi:nil="true"/>
+    <ApprovalLog xmlns="4873beb7-5857-4685-be1f-d57550cc96cc" xsi:nil="true"/>
+    <AssetType xmlns="4873beb7-5857-4685-be1f-d57550cc96cc">TP</AssetType>
+    <BugNumber xmlns="4873beb7-5857-4685-be1f-d57550cc96cc" xsi:nil="true"/>
+    <CSXSubmissionDate xmlns="4873beb7-5857-4685-be1f-d57550cc96cc" xsi:nil="true"/>
+    <CSXUpdate xmlns="4873beb7-5857-4685-be1f-d57550cc96cc">false</CSXUpdate>
+    <Milestone xmlns="4873beb7-5857-4685-be1f-d57550cc96cc" xsi:nil="true"/>
+    <RecommendationsModifier xmlns="4873beb7-5857-4685-be1f-d57550cc96cc" xsi:nil="true"/>
+    <OriginAsset xmlns="4873beb7-5857-4685-be1f-d57550cc96cc" xsi:nil="true"/>
+    <TPComponent xmlns="4873beb7-5857-4685-be1f-d57550cc96cc" xsi:nil="true"/>
+    <AssetId xmlns="4873beb7-5857-4685-be1f-d57550cc96cc">TP102787989</AssetId>
+    <IntlLocPriority xmlns="4873beb7-5857-4685-be1f-d57550cc96cc" xsi:nil="true"/>
+    <PolicheckWords xmlns="4873beb7-5857-4685-be1f-d57550cc96cc" xsi:nil="true"/>
+    <TPLaunchHelpLink xmlns="4873beb7-5857-4685-be1f-d57550cc96cc" xsi:nil="true"/>
+    <TPApplication xmlns="4873beb7-5857-4685-be1f-d57550cc96cc" xsi:nil="true"/>
+    <CrawlForDependencies xmlns="4873beb7-5857-4685-be1f-d57550cc96cc">false</CrawlForDependencies>
+    <HandoffToMSDN xmlns="4873beb7-5857-4685-be1f-d57550cc96cc" xsi:nil="true"/>
+    <PlannedPubDate xmlns="4873beb7-5857-4685-be1f-d57550cc96cc" xsi:nil="true"/>
+    <IntlLangReviewer xmlns="4873beb7-5857-4685-be1f-d57550cc96cc" xsi:nil="true"/>
+    <TrustLevel xmlns="4873beb7-5857-4685-be1f-d57550cc96cc">1 Microsoft Managed Content</TrustLevel>
+    <LocLastLocAttemptVersionLookup xmlns="4873beb7-5857-4685-be1f-d57550cc96cc">694266</LocLastLocAttemptVersionLookup>
+    <LocProcessedForHandoffsLookup xmlns="4873beb7-5857-4685-be1f-d57550cc96cc" xsi:nil="true"/>
+    <IsSearchable xmlns="4873beb7-5857-4685-be1f-d57550cc96cc">true</IsSearchable>
+    <TemplateTemplateType xmlns="4873beb7-5857-4685-be1f-d57550cc96cc">PowerPoint Presentation Template</TemplateTemplateType>
+    <CampaignTagsTaxHTField0 xmlns="4873beb7-5857-4685-be1f-d57550cc96cc">
+      <Terms xmlns="http://schemas.microsoft.com/office/infopath/2007/PartnerControls"/>
+    </CampaignTagsTaxHTField0>
+    <TPNamespace xmlns="4873beb7-5857-4685-be1f-d57550cc96cc" xsi:nil="true"/>
+    <LocOverallPreviewStatusLookup xmlns="4873beb7-5857-4685-be1f-d57550cc96cc" xsi:nil="true"/>
+    <TaxCatchAll xmlns="4873beb7-5857-4685-be1f-d57550cc96cc"/>
+    <Markets xmlns="4873beb7-5857-4685-be1f-d57550cc96cc"/>
+    <UAProjectedTotalWords xmlns="4873beb7-5857-4685-be1f-d57550cc96cc" xsi:nil="true"/>
+    <IntlLangReview xmlns="4873beb7-5857-4685-be1f-d57550cc96cc" xsi:nil="true"/>
+    <OutputCachingOn xmlns="4873beb7-5857-4685-be1f-d57550cc96cc">false</OutputCachingOn>
+    <AverageRating xmlns="4873beb7-5857-4685-be1f-d57550cc96cc" xsi:nil="true"/>
+    <APAuthor xmlns="4873beb7-5857-4685-be1f-d57550cc96cc">
+      <UserInfo>
+        <DisplayName>REDMOND\kristaa</DisplayName>
+        <AccountId>136</AccountId>
+        <AccountType/>
+      </UserInfo>
+    </APAuthor>
+    <LocManualTestRequired xmlns="4873beb7-5857-4685-be1f-d57550cc96cc">false</LocManualTestRequired>
+    <TPCommandLine xmlns="4873beb7-5857-4685-be1f-d57550cc96cc" xsi:nil="true"/>
+    <TPAppVersion xmlns="4873beb7-5857-4685-be1f-d57550cc96cc" xsi:nil="true"/>
+    <EditorialStatus xmlns="4873beb7-5857-4685-be1f-d57550cc96cc">Complete</EditorialStatus>
+    <LastModifiedDateTime xmlns="4873beb7-5857-4685-be1f-d57550cc96cc" xsi:nil="true"/>
+    <ScenarioTagsTaxHTField0 xmlns="4873beb7-5857-4685-be1f-d57550cc96cc">
+      <Terms xmlns="http://schemas.microsoft.com/office/infopath/2007/PartnerControls"/>
+    </ScenarioTagsTaxHTField0>
+    <LocProcessedForMarketsLookup xmlns="4873beb7-5857-4685-be1f-d57550cc96cc" xsi:nil="true"/>
+    <TPLaunchHelpLinkType xmlns="4873beb7-5857-4685-be1f-d57550cc96cc">Template</TPLaunchHelpLinkType>
+    <OriginalRelease xmlns="4873beb7-5857-4685-be1f-d57550cc96cc">15</OriginalRelease>
+    <LocalizationTagsTaxHTField0 xmlns="4873beb7-5857-4685-be1f-d57550cc96cc">
+      <Terms xmlns="http://schemas.microsoft.com/office/infopath/2007/PartnerControls"/>
+    </LocalizationTagsTaxHTField0>
+    <UACurrentWords xmlns="4873beb7-5857-4685-be1f-d57550cc96cc" xsi:nil="true"/>
+    <ArtSampleDocs xmlns="4873beb7-5857-4685-be1f-d57550cc96cc" xsi:nil="true"/>
+    <UALocRecommendation xmlns="4873beb7-5857-4685-be1f-d57550cc96cc">Localize</UALocRecommendation>
+    <Manager xmlns="4873beb7-5857-4685-be1f-d57550cc96cc" xsi:nil="true"/>
+    <LocOverallHandbackStatusLookup xmlns="4873beb7-5857-4685-be1f-d57550cc96cc" xsi:nil="true"/>
+    <ShowIn xmlns="4873beb7-5857-4685-be1f-d57550cc96cc">Show everywhere</ShowIn>
+    <UANotes xmlns="4873beb7-5857-4685-be1f-d57550cc96cc" xsi:nil="true"/>
+    <InternalTagsTaxHTField0 xmlns="4873beb7-5857-4685-be1f-d57550cc96cc">
+      <Terms xmlns="http://schemas.microsoft.com/office/infopath/2007/PartnerControls"/>
+    </InternalTagsTaxHTField0>
+    <CSXHash xmlns="4873beb7-5857-4685-be1f-d57550cc96cc" xsi:nil="true"/>
+    <VoteCount xmlns="4873beb7-5857-4685-be1f-d57550cc96cc" xsi:nil="true"/>
+    <AssetExpire xmlns="4873beb7-5857-4685-be1f-d57550cc96cc">2029-05-12T07:00:00+00:00</AssetExpire>
+    <DSATActionTaken xmlns="4873beb7-5857-4685-be1f-d57550cc96cc" xsi:nil="true"/>
+    <CSXSubmissionMarket xmlns="4873beb7-5857-4685-be1f-d57550cc96cc" xsi:nil="true"/>
+    <LocMarketGroupTiers2 xmlns="4873beb7-5857-4685-be1f-d57550cc96cc" xsi:nil="true"/>
+  </documentManagement>
+</p:properties>
+</file>
+
+<file path=customXml/item3.xml><?xml version="1.0" encoding="utf-8"?>
 <ct:contentTypeSchema xmlns:ct="http://schemas.microsoft.com/office/2006/metadata/contentType" xmlns:ma="http://schemas.microsoft.com/office/2006/metadata/properties/metaAttributes" ct:_="" ma:_="" ma:contentTypeName="TemplateFile" ma:contentTypeID="0x0101006EDDDB5EE6D98C44930B742096920B300400F5B6D36B3EF94B4E9A635CDF2A18F5B8" ma:contentTypeVersion="72" ma:contentTypeDescription="Create a new document." ma:contentTypeScope="" ma:versionID="a23e56308344d904b51738559c3d67c9">
   <xsd:schema xmlns:xsd="http://www.w3.org/2001/XMLSchema" xmlns:xs="http://www.w3.org/2001/XMLSchema" xmlns:p="http://schemas.microsoft.com/office/2006/metadata/properties" xmlns:ns2="4873beb7-5857-4685-be1f-d57550cc96cc" targetNamespace="http://schemas.microsoft.com/office/2006/metadata/properties" ma:root="true" ma:fieldsID="cd0908cc4600e77bf5da051303e00c8d" ns2:_="">
     <xsd:import namespace="4873beb7-5857-4685-be1f-d57550cc96cc"/>
@@ -15476,142 +15611,6 @@
 </ct:contentTypeSchema>
 </file>
 
-<file path=customXml/item3.xml><?xml version="1.0" encoding="utf-8"?>
-<p:properties xmlns:p="http://schemas.microsoft.com/office/2006/metadata/properties" xmlns:xsi="http://www.w3.org/2001/XMLSchema-instance" xmlns:pc="http://schemas.microsoft.com/office/infopath/2007/PartnerControls">
-  <documentManagement>
-    <LocPublishedLinkedAssetsLookup xmlns="4873beb7-5857-4685-be1f-d57550cc96cc" xsi:nil="true"/>
-    <ApprovalStatus xmlns="4873beb7-5857-4685-be1f-d57550cc96cc">InProgress</ApprovalStatus>
-    <MarketSpecific xmlns="4873beb7-5857-4685-be1f-d57550cc96cc">false</MarketSpecific>
-    <LocComments xmlns="4873beb7-5857-4685-be1f-d57550cc96cc" xsi:nil="true"/>
-    <LocLastLocAttemptVersionTypeLookup xmlns="4873beb7-5857-4685-be1f-d57550cc96cc" xsi:nil="true"/>
-    <DirectSourceMarket xmlns="4873beb7-5857-4685-be1f-d57550cc96cc" xsi:nil="true"/>
-    <ThumbnailAssetId xmlns="4873beb7-5857-4685-be1f-d57550cc96cc" xsi:nil="true"/>
-    <PrimaryImageGen xmlns="4873beb7-5857-4685-be1f-d57550cc96cc">false</PrimaryImageGen>
-    <LocNewPublishedVersionLookup xmlns="4873beb7-5857-4685-be1f-d57550cc96cc" xsi:nil="true"/>
-    <LegacyData xmlns="4873beb7-5857-4685-be1f-d57550cc96cc" xsi:nil="true"/>
-    <LocRecommendedHandoff xmlns="4873beb7-5857-4685-be1f-d57550cc96cc" xsi:nil="true"/>
-    <BusinessGroup xmlns="4873beb7-5857-4685-be1f-d57550cc96cc" xsi:nil="true"/>
-    <BlockPublish xmlns="4873beb7-5857-4685-be1f-d57550cc96cc">false</BlockPublish>
-    <TPFriendlyName xmlns="4873beb7-5857-4685-be1f-d57550cc96cc" xsi:nil="true"/>
-    <LocOverallPublishStatusLookup xmlns="4873beb7-5857-4685-be1f-d57550cc96cc" xsi:nil="true"/>
-    <NumericId xmlns="4873beb7-5857-4685-be1f-d57550cc96cc" xsi:nil="true"/>
-    <APEditor xmlns="4873beb7-5857-4685-be1f-d57550cc96cc">
-      <UserInfo>
-        <DisplayName/>
-        <AccountId xsi:nil="true"/>
-        <AccountType/>
-      </UserInfo>
-    </APEditor>
-    <SourceTitle xmlns="4873beb7-5857-4685-be1f-d57550cc96cc" xsi:nil="true"/>
-    <OpenTemplate xmlns="4873beb7-5857-4685-be1f-d57550cc96cc">true</OpenTemplate>
-    <LocOverallLocStatusLookup xmlns="4873beb7-5857-4685-be1f-d57550cc96cc" xsi:nil="true"/>
-    <UALocComments xmlns="4873beb7-5857-4685-be1f-d57550cc96cc" xsi:nil="true"/>
-    <ParentAssetId xmlns="4873beb7-5857-4685-be1f-d57550cc96cc" xsi:nil="true"/>
-    <IntlLangReviewDate xmlns="4873beb7-5857-4685-be1f-d57550cc96cc" xsi:nil="true"/>
-    <FeatureTagsTaxHTField0 xmlns="4873beb7-5857-4685-be1f-d57550cc96cc">
-      <Terms xmlns="http://schemas.microsoft.com/office/infopath/2007/PartnerControls"/>
-    </FeatureTagsTaxHTField0>
-    <PublishStatusLookup xmlns="4873beb7-5857-4685-be1f-d57550cc96cc">
-      <Value>1345093</Value>
-    </PublishStatusLookup>
-    <Providers xmlns="4873beb7-5857-4685-be1f-d57550cc96cc" xsi:nil="true"/>
-    <MachineTranslated xmlns="4873beb7-5857-4685-be1f-d57550cc96cc">false</MachineTranslated>
-    <OriginalSourceMarket xmlns="4873beb7-5857-4685-be1f-d57550cc96cc" xsi:nil="true"/>
-    <APDescription xmlns="4873beb7-5857-4685-be1f-d57550cc96cc">This simple template design works for technology and  businesses, but it's versatile enough to use in other contexts.  It features multiple slide layouts designed for widescreen (16x9 resolution) and includes a sample SmartArt list and chart that are easily editable.</APDescription>
-    <ClipArtFilename xmlns="4873beb7-5857-4685-be1f-d57550cc96cc" xsi:nil="true"/>
-    <ContentItem xmlns="4873beb7-5857-4685-be1f-d57550cc96cc" xsi:nil="true"/>
-    <TPInstallLocation xmlns="4873beb7-5857-4685-be1f-d57550cc96cc" xsi:nil="true"/>
-    <PublishTargets xmlns="4873beb7-5857-4685-be1f-d57550cc96cc">OfficeOnlineVNext</PublishTargets>
-    <TimesCloned xmlns="4873beb7-5857-4685-be1f-d57550cc96cc" xsi:nil="true"/>
-    <AssetStart xmlns="4873beb7-5857-4685-be1f-d57550cc96cc">2011-11-26T00:30:00+00:00</AssetStart>
-    <Provider xmlns="4873beb7-5857-4685-be1f-d57550cc96cc" xsi:nil="true"/>
-    <AcquiredFrom xmlns="4873beb7-5857-4685-be1f-d57550cc96cc">Internal MS</AcquiredFrom>
-    <FriendlyTitle xmlns="4873beb7-5857-4685-be1f-d57550cc96cc" xsi:nil="true"/>
-    <LastHandOff xmlns="4873beb7-5857-4685-be1f-d57550cc96cc" xsi:nil="true"/>
-    <TPClientViewer xmlns="4873beb7-5857-4685-be1f-d57550cc96cc" xsi:nil="true"/>
-    <TemplateStatus xmlns="4873beb7-5857-4685-be1f-d57550cc96cc">Complete</TemplateStatus>
-    <Downloads xmlns="4873beb7-5857-4685-be1f-d57550cc96cc">0</Downloads>
-    <OOCacheId xmlns="4873beb7-5857-4685-be1f-d57550cc96cc" xsi:nil="true"/>
-    <IsDeleted xmlns="4873beb7-5857-4685-be1f-d57550cc96cc">false</IsDeleted>
-    <LocPublishedDependentAssetsLookup xmlns="4873beb7-5857-4685-be1f-d57550cc96cc" xsi:nil="true"/>
-    <TPExecutable xmlns="4873beb7-5857-4685-be1f-d57550cc96cc" xsi:nil="true"/>
-    <EditorialTags xmlns="4873beb7-5857-4685-be1f-d57550cc96cc" xsi:nil="true"/>
-    <SubmitterId xmlns="4873beb7-5857-4685-be1f-d57550cc96cc" xsi:nil="true"/>
-    <ApprovalLog xmlns="4873beb7-5857-4685-be1f-d57550cc96cc" xsi:nil="true"/>
-    <AssetType xmlns="4873beb7-5857-4685-be1f-d57550cc96cc">TP</AssetType>
-    <BugNumber xmlns="4873beb7-5857-4685-be1f-d57550cc96cc" xsi:nil="true"/>
-    <CSXSubmissionDate xmlns="4873beb7-5857-4685-be1f-d57550cc96cc" xsi:nil="true"/>
-    <CSXUpdate xmlns="4873beb7-5857-4685-be1f-d57550cc96cc">false</CSXUpdate>
-    <Milestone xmlns="4873beb7-5857-4685-be1f-d57550cc96cc" xsi:nil="true"/>
-    <RecommendationsModifier xmlns="4873beb7-5857-4685-be1f-d57550cc96cc" xsi:nil="true"/>
-    <OriginAsset xmlns="4873beb7-5857-4685-be1f-d57550cc96cc" xsi:nil="true"/>
-    <TPComponent xmlns="4873beb7-5857-4685-be1f-d57550cc96cc" xsi:nil="true"/>
-    <AssetId xmlns="4873beb7-5857-4685-be1f-d57550cc96cc">TP102787989</AssetId>
-    <IntlLocPriority xmlns="4873beb7-5857-4685-be1f-d57550cc96cc" xsi:nil="true"/>
-    <PolicheckWords xmlns="4873beb7-5857-4685-be1f-d57550cc96cc" xsi:nil="true"/>
-    <TPLaunchHelpLink xmlns="4873beb7-5857-4685-be1f-d57550cc96cc" xsi:nil="true"/>
-    <TPApplication xmlns="4873beb7-5857-4685-be1f-d57550cc96cc" xsi:nil="true"/>
-    <CrawlForDependencies xmlns="4873beb7-5857-4685-be1f-d57550cc96cc">false</CrawlForDependencies>
-    <HandoffToMSDN xmlns="4873beb7-5857-4685-be1f-d57550cc96cc" xsi:nil="true"/>
-    <PlannedPubDate xmlns="4873beb7-5857-4685-be1f-d57550cc96cc" xsi:nil="true"/>
-    <IntlLangReviewer xmlns="4873beb7-5857-4685-be1f-d57550cc96cc" xsi:nil="true"/>
-    <TrustLevel xmlns="4873beb7-5857-4685-be1f-d57550cc96cc">1 Microsoft Managed Content</TrustLevel>
-    <LocLastLocAttemptVersionLookup xmlns="4873beb7-5857-4685-be1f-d57550cc96cc">694266</LocLastLocAttemptVersionLookup>
-    <LocProcessedForHandoffsLookup xmlns="4873beb7-5857-4685-be1f-d57550cc96cc" xsi:nil="true"/>
-    <IsSearchable xmlns="4873beb7-5857-4685-be1f-d57550cc96cc">true</IsSearchable>
-    <TemplateTemplateType xmlns="4873beb7-5857-4685-be1f-d57550cc96cc">PowerPoint Presentation Template</TemplateTemplateType>
-    <CampaignTagsTaxHTField0 xmlns="4873beb7-5857-4685-be1f-d57550cc96cc">
-      <Terms xmlns="http://schemas.microsoft.com/office/infopath/2007/PartnerControls"/>
-    </CampaignTagsTaxHTField0>
-    <TPNamespace xmlns="4873beb7-5857-4685-be1f-d57550cc96cc" xsi:nil="true"/>
-    <LocOverallPreviewStatusLookup xmlns="4873beb7-5857-4685-be1f-d57550cc96cc" xsi:nil="true"/>
-    <TaxCatchAll xmlns="4873beb7-5857-4685-be1f-d57550cc96cc"/>
-    <Markets xmlns="4873beb7-5857-4685-be1f-d57550cc96cc"/>
-    <UAProjectedTotalWords xmlns="4873beb7-5857-4685-be1f-d57550cc96cc" xsi:nil="true"/>
-    <IntlLangReview xmlns="4873beb7-5857-4685-be1f-d57550cc96cc" xsi:nil="true"/>
-    <OutputCachingOn xmlns="4873beb7-5857-4685-be1f-d57550cc96cc">false</OutputCachingOn>
-    <AverageRating xmlns="4873beb7-5857-4685-be1f-d57550cc96cc" xsi:nil="true"/>
-    <APAuthor xmlns="4873beb7-5857-4685-be1f-d57550cc96cc">
-      <UserInfo>
-        <DisplayName>REDMOND\kristaa</DisplayName>
-        <AccountId>136</AccountId>
-        <AccountType/>
-      </UserInfo>
-    </APAuthor>
-    <LocManualTestRequired xmlns="4873beb7-5857-4685-be1f-d57550cc96cc">false</LocManualTestRequired>
-    <TPCommandLine xmlns="4873beb7-5857-4685-be1f-d57550cc96cc" xsi:nil="true"/>
-    <TPAppVersion xmlns="4873beb7-5857-4685-be1f-d57550cc96cc" xsi:nil="true"/>
-    <EditorialStatus xmlns="4873beb7-5857-4685-be1f-d57550cc96cc">Complete</EditorialStatus>
-    <LastModifiedDateTime xmlns="4873beb7-5857-4685-be1f-d57550cc96cc" xsi:nil="true"/>
-    <ScenarioTagsTaxHTField0 xmlns="4873beb7-5857-4685-be1f-d57550cc96cc">
-      <Terms xmlns="http://schemas.microsoft.com/office/infopath/2007/PartnerControls"/>
-    </ScenarioTagsTaxHTField0>
-    <LocProcessedForMarketsLookup xmlns="4873beb7-5857-4685-be1f-d57550cc96cc" xsi:nil="true"/>
-    <TPLaunchHelpLinkType xmlns="4873beb7-5857-4685-be1f-d57550cc96cc">Template</TPLaunchHelpLinkType>
-    <OriginalRelease xmlns="4873beb7-5857-4685-be1f-d57550cc96cc">15</OriginalRelease>
-    <LocalizationTagsTaxHTField0 xmlns="4873beb7-5857-4685-be1f-d57550cc96cc">
-      <Terms xmlns="http://schemas.microsoft.com/office/infopath/2007/PartnerControls"/>
-    </LocalizationTagsTaxHTField0>
-    <UACurrentWords xmlns="4873beb7-5857-4685-be1f-d57550cc96cc" xsi:nil="true"/>
-    <ArtSampleDocs xmlns="4873beb7-5857-4685-be1f-d57550cc96cc" xsi:nil="true"/>
-    <UALocRecommendation xmlns="4873beb7-5857-4685-be1f-d57550cc96cc">Localize</UALocRecommendation>
-    <Manager xmlns="4873beb7-5857-4685-be1f-d57550cc96cc" xsi:nil="true"/>
-    <LocOverallHandbackStatusLookup xmlns="4873beb7-5857-4685-be1f-d57550cc96cc" xsi:nil="true"/>
-    <ShowIn xmlns="4873beb7-5857-4685-be1f-d57550cc96cc">Show everywhere</ShowIn>
-    <UANotes xmlns="4873beb7-5857-4685-be1f-d57550cc96cc" xsi:nil="true"/>
-    <InternalTagsTaxHTField0 xmlns="4873beb7-5857-4685-be1f-d57550cc96cc">
-      <Terms xmlns="http://schemas.microsoft.com/office/infopath/2007/PartnerControls"/>
-    </InternalTagsTaxHTField0>
-    <CSXHash xmlns="4873beb7-5857-4685-be1f-d57550cc96cc" xsi:nil="true"/>
-    <VoteCount xmlns="4873beb7-5857-4685-be1f-d57550cc96cc" xsi:nil="true"/>
-    <AssetExpire xmlns="4873beb7-5857-4685-be1f-d57550cc96cc">2029-05-12T07:00:00+00:00</AssetExpire>
-    <DSATActionTaken xmlns="4873beb7-5857-4685-be1f-d57550cc96cc" xsi:nil="true"/>
-    <CSXSubmissionMarket xmlns="4873beb7-5857-4685-be1f-d57550cc96cc" xsi:nil="true"/>
-    <LocMarketGroupTiers2 xmlns="4873beb7-5857-4685-be1f-d57550cc96cc" xsi:nil="true"/>
-  </documentManagement>
-</p:properties>
-</file>
-
 <file path=customXml/itemProps1.xml><?xml version="1.0" encoding="utf-8"?>
 <ds:datastoreItem xmlns:ds="http://schemas.openxmlformats.org/officeDocument/2006/customXml" ds:itemID="{3836F65B-1B07-41EE-A0E8-BC6EF3855225}">
   <ds:schemaRefs>
@@ -15621,6 +15620,22 @@
 </file>
 
 <file path=customXml/itemProps2.xml><?xml version="1.0" encoding="utf-8"?>
+<ds:datastoreItem xmlns:ds="http://schemas.openxmlformats.org/officeDocument/2006/customXml" ds:itemID="{60C67BEE-D13F-4BD2-98A5-34D8A0977F68}">
+  <ds:schemaRefs>
+    <ds:schemaRef ds:uri="4873beb7-5857-4685-be1f-d57550cc96cc"/>
+    <ds:schemaRef ds:uri="http://schemas.openxmlformats.org/package/2006/metadata/core-properties"/>
+    <ds:schemaRef ds:uri="http://purl.org/dc/terms/"/>
+    <ds:schemaRef ds:uri="http://schemas.microsoft.com/office/2006/documentManagement/types"/>
+    <ds:schemaRef ds:uri="http://purl.org/dc/elements/1.1/"/>
+    <ds:schemaRef ds:uri="http://schemas.microsoft.com/office/2006/metadata/properties"/>
+    <ds:schemaRef ds:uri="http://schemas.microsoft.com/office/infopath/2007/PartnerControls"/>
+    <ds:schemaRef ds:uri="http://www.w3.org/XML/1998/namespace"/>
+    <ds:schemaRef ds:uri="http://purl.org/dc/dcmitype/"/>
+  </ds:schemaRefs>
+</ds:datastoreItem>
+</file>
+
+<file path=customXml/itemProps3.xml><?xml version="1.0" encoding="utf-8"?>
 <ds:datastoreItem xmlns:ds="http://schemas.openxmlformats.org/officeDocument/2006/customXml" ds:itemID="{A09BF4D4-EF60-4196-BFC3-9462D607978C}">
   <ds:schemaRefs>
     <ds:schemaRef ds:uri="http://schemas.microsoft.com/office/2006/metadata/contentType"/>
@@ -15636,20 +15651,4 @@
     <ds:schemaRef ds:uri="http://schemas.microsoft.com/internal/obd"/>
   </ds:schemaRefs>
 </ds:datastoreItem>
-</file>
-
-<file path=customXml/itemProps3.xml><?xml version="1.0" encoding="utf-8"?>
-<ds:datastoreItem xmlns:ds="http://schemas.openxmlformats.org/officeDocument/2006/customXml" ds:itemID="{60C67BEE-D13F-4BD2-98A5-34D8A0977F68}">
-  <ds:schemaRefs>
-    <ds:schemaRef ds:uri="4873beb7-5857-4685-be1f-d57550cc96cc"/>
-    <ds:schemaRef ds:uri="http://schemas.openxmlformats.org/package/2006/metadata/core-properties"/>
-    <ds:schemaRef ds:uri="http://purl.org/dc/terms/"/>
-    <ds:schemaRef ds:uri="http://schemas.microsoft.com/office/2006/documentManagement/types"/>
-    <ds:schemaRef ds:uri="http://purl.org/dc/elements/1.1/"/>
-    <ds:schemaRef ds:uri="http://schemas.microsoft.com/office/2006/metadata/properties"/>
-    <ds:schemaRef ds:uri="http://schemas.microsoft.com/office/infopath/2007/PartnerControls"/>
-    <ds:schemaRef ds:uri="http://www.w3.org/XML/1998/namespace"/>
-    <ds:schemaRef ds:uri="http://purl.org/dc/dcmitype/"/>
-  </ds:schemaRefs>
-</ds:datastoreItem>
 </file>
</xml_diff>